<commit_message>
added m14 mongo slides and queries
</commit_message>
<xml_diff>
--- a/template.pptx
+++ b/template.pptx
@@ -121,6 +121,10 @@
 </p:presentation>
 </file>
 
+<file path=ppt/revisionInfo.xml><?xml version="1.0" encoding="utf-8"?>
+<p1510:revInfo xmlns:a="http://schemas.openxmlformats.org/drawingml/2006/main" xmlns:r="http://schemas.openxmlformats.org/officeDocument/2006/relationships" xmlns:p1510="http://schemas.microsoft.com/office/powerpoint/2015/10/main"/>
+</file>
+
 <file path=ppt/handoutMasters/handoutMaster1.xml><?xml version="1.0" encoding="utf-8"?>
 <p:handoutMaster xmlns:a="http://schemas.openxmlformats.org/drawingml/2006/main" xmlns:r="http://schemas.openxmlformats.org/officeDocument/2006/relationships" xmlns:p="http://schemas.openxmlformats.org/presentationml/2006/main">
   <p:cSld>
@@ -203,7 +207,7 @@
           <a:p>
             <a:fld id="{A0B41EB9-7971-5544-BD7F-525B22CFBC36}" type="datetimeFigureOut">
               <a:rPr lang="en-US" smtClean="0"/>
-              <a:t>7/25/17</a:t>
+              <a:t>7/26/2017</a:t>
             </a:fld>
             <a:endParaRPr lang="en-US"/>
           </a:p>
@@ -368,7 +372,7 @@
           <a:p>
             <a:fld id="{205CF534-097E-6546-AAC2-359745A6CD51}" type="datetimeFigureOut">
               <a:rPr lang="en-US" smtClean="0"/>
-              <a:t>7/25/17</a:t>
+              <a:t>7/26/2017</a:t>
             </a:fld>
             <a:endParaRPr lang="en-US"/>
           </a:p>
@@ -432,38 +436,37 @@
           <a:p>
             <a:pPr lvl="0"/>
             <a:r>
-              <a:rPr lang="en-US" smtClean="0"/>
+              <a:rPr lang="en-US"/>
               <a:t>Click to edit Master text styles</a:t>
             </a:r>
           </a:p>
           <a:p>
             <a:pPr lvl="1"/>
             <a:r>
-              <a:rPr lang="en-US" smtClean="0"/>
+              <a:rPr lang="en-US"/>
               <a:t>Second level</a:t>
             </a:r>
           </a:p>
           <a:p>
             <a:pPr lvl="2"/>
             <a:r>
-              <a:rPr lang="en-US" smtClean="0"/>
+              <a:rPr lang="en-US"/>
               <a:t>Third level</a:t>
             </a:r>
           </a:p>
           <a:p>
             <a:pPr lvl="3"/>
             <a:r>
-              <a:rPr lang="en-US" smtClean="0"/>
+              <a:rPr lang="en-US"/>
               <a:t>Fourth level</a:t>
             </a:r>
           </a:p>
           <a:p>
             <a:pPr lvl="4"/>
             <a:r>
-              <a:rPr lang="en-US" smtClean="0"/>
+              <a:rPr lang="en-US"/>
               <a:t>Fifth level</a:t>
             </a:r>
-            <a:endParaRPr lang="en-US"/>
           </a:p>
         </p:txBody>
       </p:sp>
@@ -688,10 +691,9 @@
           </a:lstStyle>
           <a:p>
             <a:r>
-              <a:rPr lang="en-US" dirty="0" smtClean="0"/>
+              <a:rPr lang="en-US" dirty="0"/>
               <a:t>This is a sample Text</a:t>
             </a:r>
-            <a:endParaRPr lang="en-US" dirty="0"/>
           </a:p>
         </p:txBody>
       </p:sp>
@@ -836,10 +838,9 @@
           </a:lstStyle>
           <a:p>
             <a:r>
-              <a:rPr lang="en-US" dirty="0" smtClean="0"/>
+              <a:rPr lang="en-US" dirty="0"/>
               <a:t>Click to edit Master subtitle style</a:t>
             </a:r>
-            <a:endParaRPr lang="en-US" dirty="0"/>
           </a:p>
         </p:txBody>
       </p:sp>
@@ -853,13 +854,6 @@
   <p:clrMapOvr>
     <a:masterClrMapping/>
   </p:clrMapOvr>
-  <p:timing>
-    <p:tnLst>
-      <p:par>
-        <p:cTn id="1" dur="indefinite" restart="never" nodeType="tmRoot"/>
-      </p:par>
-    </p:tnLst>
-  </p:timing>
 </p:sldLayout>
 </file>
 
@@ -910,10 +904,9 @@
           </a:lstStyle>
           <a:p>
             <a:r>
-              <a:rPr lang="en-US" dirty="0" smtClean="0"/>
+              <a:rPr lang="en-US" dirty="0"/>
               <a:t>Click to edit Master title style</a:t>
             </a:r>
-            <a:endParaRPr lang="en-US" dirty="0"/>
           </a:p>
         </p:txBody>
       </p:sp>
@@ -970,38 +963,37 @@
           <a:p>
             <a:pPr lvl="0"/>
             <a:r>
-              <a:rPr lang="en-US" dirty="0" smtClean="0"/>
+              <a:rPr lang="en-US" dirty="0"/>
               <a:t>Click to edit Master text styles</a:t>
             </a:r>
           </a:p>
           <a:p>
             <a:pPr lvl="1"/>
             <a:r>
-              <a:rPr lang="en-US" dirty="0" smtClean="0"/>
+              <a:rPr lang="en-US" dirty="0"/>
               <a:t>Second level</a:t>
             </a:r>
           </a:p>
           <a:p>
             <a:pPr lvl="2"/>
             <a:r>
-              <a:rPr lang="en-US" dirty="0" smtClean="0"/>
+              <a:rPr lang="en-US" dirty="0"/>
               <a:t>Third level</a:t>
             </a:r>
           </a:p>
           <a:p>
             <a:pPr lvl="3"/>
             <a:r>
-              <a:rPr lang="en-US" dirty="0" smtClean="0"/>
+              <a:rPr lang="en-US" dirty="0"/>
               <a:t>Fourth level</a:t>
             </a:r>
           </a:p>
           <a:p>
             <a:pPr lvl="4"/>
             <a:r>
-              <a:rPr lang="en-US" dirty="0" smtClean="0"/>
+              <a:rPr lang="en-US" dirty="0"/>
               <a:t>Fifth level</a:t>
             </a:r>
-            <a:endParaRPr lang="en-US" dirty="0"/>
           </a:p>
         </p:txBody>
       </p:sp>
@@ -1015,13 +1007,6 @@
   <p:clrMapOvr>
     <a:masterClrMapping/>
   </p:clrMapOvr>
-  <p:timing>
-    <p:tnLst>
-      <p:par>
-        <p:cTn id="1" dur="indefinite" restart="never" nodeType="tmRoot"/>
-      </p:par>
-    </p:tnLst>
-  </p:timing>
 </p:sldLayout>
 </file>
 
@@ -1072,10 +1057,9 @@
           </a:lstStyle>
           <a:p>
             <a:r>
-              <a:rPr lang="en-US" dirty="0" smtClean="0"/>
+              <a:rPr lang="en-US" dirty="0"/>
               <a:t>Click to edit Master title style</a:t>
             </a:r>
-            <a:endParaRPr lang="en-US" dirty="0"/>
           </a:p>
         </p:txBody>
       </p:sp>
@@ -1132,38 +1116,37 @@
           <a:p>
             <a:pPr lvl="0"/>
             <a:r>
-              <a:rPr lang="en-US" dirty="0" smtClean="0"/>
+              <a:rPr lang="en-US" dirty="0"/>
               <a:t>Click to edit Master text styles</a:t>
             </a:r>
           </a:p>
           <a:p>
             <a:pPr lvl="1"/>
             <a:r>
-              <a:rPr lang="en-US" dirty="0" smtClean="0"/>
+              <a:rPr lang="en-US" dirty="0"/>
               <a:t>Second level</a:t>
             </a:r>
           </a:p>
           <a:p>
             <a:pPr lvl="2"/>
             <a:r>
-              <a:rPr lang="en-US" dirty="0" smtClean="0"/>
+              <a:rPr lang="en-US" dirty="0"/>
               <a:t>Third level</a:t>
             </a:r>
           </a:p>
           <a:p>
             <a:pPr lvl="3"/>
             <a:r>
-              <a:rPr lang="en-US" dirty="0" smtClean="0"/>
+              <a:rPr lang="en-US" dirty="0"/>
               <a:t>Fourth level</a:t>
             </a:r>
           </a:p>
           <a:p>
             <a:pPr lvl="4"/>
             <a:r>
-              <a:rPr lang="en-US" dirty="0" smtClean="0"/>
+              <a:rPr lang="en-US" dirty="0"/>
               <a:t>Fifth level</a:t>
             </a:r>
-            <a:endParaRPr lang="en-US" dirty="0"/>
           </a:p>
         </p:txBody>
       </p:sp>
@@ -1177,13 +1160,6 @@
   <p:clrMapOvr>
     <a:masterClrMapping/>
   </p:clrMapOvr>
-  <p:timing>
-    <p:tnLst>
-      <p:par>
-        <p:cTn id="1" dur="indefinite" restart="never" nodeType="tmRoot"/>
-      </p:par>
-    </p:tnLst>
-  </p:timing>
 </p:sldLayout>
 </file>
 
@@ -1234,10 +1210,9 @@
           </a:lstStyle>
           <a:p>
             <a:r>
-              <a:rPr lang="en-US" dirty="0" smtClean="0"/>
+              <a:rPr lang="en-US" dirty="0"/>
               <a:t>Click to edit Master title style</a:t>
             </a:r>
-            <a:endParaRPr lang="en-US" dirty="0"/>
           </a:p>
         </p:txBody>
       </p:sp>
@@ -1294,38 +1269,37 @@
           <a:p>
             <a:pPr lvl="0"/>
             <a:r>
-              <a:rPr lang="en-US" dirty="0" smtClean="0"/>
+              <a:rPr lang="en-US" dirty="0"/>
               <a:t>Click to edit Master text styles</a:t>
             </a:r>
           </a:p>
           <a:p>
             <a:pPr lvl="1"/>
             <a:r>
-              <a:rPr lang="en-US" dirty="0" smtClean="0"/>
+              <a:rPr lang="en-US" dirty="0"/>
               <a:t>Second level</a:t>
             </a:r>
           </a:p>
           <a:p>
             <a:pPr lvl="2"/>
             <a:r>
-              <a:rPr lang="en-US" dirty="0" smtClean="0"/>
+              <a:rPr lang="en-US" dirty="0"/>
               <a:t>Third level</a:t>
             </a:r>
           </a:p>
           <a:p>
             <a:pPr lvl="3"/>
             <a:r>
-              <a:rPr lang="en-US" dirty="0" smtClean="0"/>
+              <a:rPr lang="en-US" dirty="0"/>
               <a:t>Fourth level</a:t>
             </a:r>
           </a:p>
           <a:p>
             <a:pPr lvl="4"/>
             <a:r>
-              <a:rPr lang="en-US" dirty="0" smtClean="0"/>
+              <a:rPr lang="en-US" dirty="0"/>
               <a:t>Fifth level</a:t>
             </a:r>
-            <a:endParaRPr lang="en-US" dirty="0"/>
           </a:p>
         </p:txBody>
       </p:sp>
@@ -1339,13 +1313,6 @@
   <p:clrMapOvr>
     <a:masterClrMapping/>
   </p:clrMapOvr>
-  <p:timing>
-    <p:tnLst>
-      <p:par>
-        <p:cTn id="1" dur="indefinite" restart="never" nodeType="tmRoot"/>
-      </p:par>
-    </p:tnLst>
-  </p:timing>
 </p:sldLayout>
 </file>
 
@@ -1396,10 +1363,9 @@
           </a:lstStyle>
           <a:p>
             <a:r>
-              <a:rPr lang="en-US" dirty="0" smtClean="0"/>
+              <a:rPr lang="en-US" dirty="0"/>
               <a:t>Click to edit Master title style</a:t>
             </a:r>
-            <a:endParaRPr lang="en-US" dirty="0"/>
           </a:p>
         </p:txBody>
       </p:sp>
@@ -1516,7 +1482,7 @@
           <a:p>
             <a:pPr lvl="0"/>
             <a:r>
-              <a:rPr lang="en-US" smtClean="0"/>
+              <a:rPr lang="en-US"/>
               <a:t>Click to edit Master text styles</a:t>
             </a:r>
           </a:p>
@@ -1532,13 +1498,6 @@
   <p:clrMapOvr>
     <a:masterClrMapping/>
   </p:clrMapOvr>
-  <p:timing>
-    <p:tnLst>
-      <p:par>
-        <p:cTn id="1" dur="indefinite" restart="never" nodeType="tmRoot"/>
-      </p:par>
-    </p:tnLst>
-  </p:timing>
 </p:sldLayout>
 </file>
 
@@ -1589,10 +1548,9 @@
           </a:lstStyle>
           <a:p>
             <a:r>
-              <a:rPr lang="en-US" dirty="0" smtClean="0"/>
+              <a:rPr lang="en-US" dirty="0"/>
               <a:t>Click to edit Master title style</a:t>
             </a:r>
-            <a:endParaRPr lang="en-US" dirty="0"/>
           </a:p>
         </p:txBody>
       </p:sp>
@@ -1649,38 +1607,37 @@
           <a:p>
             <a:pPr lvl="0"/>
             <a:r>
-              <a:rPr lang="en-US" dirty="0" smtClean="0"/>
+              <a:rPr lang="en-US" dirty="0"/>
               <a:t>Click to edit Master text styles</a:t>
             </a:r>
           </a:p>
           <a:p>
             <a:pPr lvl="1"/>
             <a:r>
-              <a:rPr lang="en-US" dirty="0" smtClean="0"/>
+              <a:rPr lang="en-US" dirty="0"/>
               <a:t>Second level</a:t>
             </a:r>
           </a:p>
           <a:p>
             <a:pPr lvl="2"/>
             <a:r>
-              <a:rPr lang="en-US" dirty="0" smtClean="0"/>
+              <a:rPr lang="en-US" dirty="0"/>
               <a:t>Third level</a:t>
             </a:r>
           </a:p>
           <a:p>
             <a:pPr lvl="3"/>
             <a:r>
-              <a:rPr lang="en-US" dirty="0" smtClean="0"/>
+              <a:rPr lang="en-US" dirty="0"/>
               <a:t>Fourth level</a:t>
             </a:r>
           </a:p>
           <a:p>
             <a:pPr lvl="4"/>
             <a:r>
-              <a:rPr lang="en-US" dirty="0" smtClean="0"/>
+              <a:rPr lang="en-US" dirty="0"/>
               <a:t>Fifth level</a:t>
             </a:r>
-            <a:endParaRPr lang="en-US" dirty="0"/>
           </a:p>
         </p:txBody>
       </p:sp>
@@ -1737,38 +1694,37 @@
           <a:p>
             <a:pPr lvl="0"/>
             <a:r>
-              <a:rPr lang="en-US" dirty="0" smtClean="0"/>
+              <a:rPr lang="en-US" dirty="0"/>
               <a:t>Click to edit Master text styles</a:t>
             </a:r>
           </a:p>
           <a:p>
             <a:pPr lvl="1"/>
             <a:r>
-              <a:rPr lang="en-US" dirty="0" smtClean="0"/>
+              <a:rPr lang="en-US" dirty="0"/>
               <a:t>Second level</a:t>
             </a:r>
           </a:p>
           <a:p>
             <a:pPr lvl="2"/>
             <a:r>
-              <a:rPr lang="en-US" dirty="0" smtClean="0"/>
+              <a:rPr lang="en-US" dirty="0"/>
               <a:t>Third level</a:t>
             </a:r>
           </a:p>
           <a:p>
             <a:pPr lvl="3"/>
             <a:r>
-              <a:rPr lang="en-US" dirty="0" smtClean="0"/>
+              <a:rPr lang="en-US" dirty="0"/>
               <a:t>Fourth level</a:t>
             </a:r>
           </a:p>
           <a:p>
             <a:pPr lvl="4"/>
             <a:r>
-              <a:rPr lang="en-US" dirty="0" smtClean="0"/>
+              <a:rPr lang="en-US" dirty="0"/>
               <a:t>Fifth level</a:t>
             </a:r>
-            <a:endParaRPr lang="en-US" dirty="0"/>
           </a:p>
         </p:txBody>
       </p:sp>
@@ -1782,13 +1738,6 @@
   <p:clrMapOvr>
     <a:masterClrMapping/>
   </p:clrMapOvr>
-  <p:timing>
-    <p:tnLst>
-      <p:par>
-        <p:cTn id="1" dur="indefinite" restart="never" nodeType="tmRoot"/>
-      </p:par>
-    </p:tnLst>
-  </p:timing>
 </p:sldLayout>
 </file>
 
@@ -1839,10 +1788,9 @@
           </a:lstStyle>
           <a:p>
             <a:r>
-              <a:rPr lang="en-US" dirty="0" smtClean="0"/>
+              <a:rPr lang="en-US" dirty="0"/>
               <a:t>Click to edit Master title style</a:t>
             </a:r>
-            <a:endParaRPr lang="en-US" dirty="0"/>
           </a:p>
         </p:txBody>
       </p:sp>
@@ -1909,7 +1857,7 @@
           <a:p>
             <a:pPr lvl="0"/>
             <a:r>
-              <a:rPr lang="en-US" dirty="0" smtClean="0"/>
+              <a:rPr lang="en-US" dirty="0"/>
               <a:t>Click to edit Master text styles</a:t>
             </a:r>
           </a:p>
@@ -1968,38 +1916,37 @@
           <a:p>
             <a:pPr lvl="0"/>
             <a:r>
-              <a:rPr lang="en-US" dirty="0" smtClean="0"/>
+              <a:rPr lang="en-US" dirty="0"/>
               <a:t>Click to edit Master text styles</a:t>
             </a:r>
           </a:p>
           <a:p>
             <a:pPr lvl="1"/>
             <a:r>
-              <a:rPr lang="en-US" dirty="0" smtClean="0"/>
+              <a:rPr lang="en-US" dirty="0"/>
               <a:t>Second level</a:t>
             </a:r>
           </a:p>
           <a:p>
             <a:pPr lvl="2"/>
             <a:r>
-              <a:rPr lang="en-US" dirty="0" smtClean="0"/>
+              <a:rPr lang="en-US" dirty="0"/>
               <a:t>Third level</a:t>
             </a:r>
           </a:p>
           <a:p>
             <a:pPr lvl="3"/>
             <a:r>
-              <a:rPr lang="en-US" dirty="0" smtClean="0"/>
+              <a:rPr lang="en-US" dirty="0"/>
               <a:t>Fourth level</a:t>
             </a:r>
           </a:p>
           <a:p>
             <a:pPr lvl="4"/>
             <a:r>
-              <a:rPr lang="en-US" dirty="0" smtClean="0"/>
+              <a:rPr lang="en-US" dirty="0"/>
               <a:t>Fifth level</a:t>
             </a:r>
-            <a:endParaRPr lang="en-US" dirty="0"/>
           </a:p>
         </p:txBody>
       </p:sp>
@@ -2066,7 +2013,7 @@
           <a:p>
             <a:pPr lvl="0"/>
             <a:r>
-              <a:rPr lang="en-US" dirty="0" smtClean="0"/>
+              <a:rPr lang="en-US" dirty="0"/>
               <a:t>Click to edit Master text styles</a:t>
             </a:r>
           </a:p>
@@ -2125,38 +2072,37 @@
           <a:p>
             <a:pPr lvl="0"/>
             <a:r>
-              <a:rPr lang="en-US" dirty="0" smtClean="0"/>
+              <a:rPr lang="en-US" dirty="0"/>
               <a:t>Click to edit Master text styles</a:t>
             </a:r>
           </a:p>
           <a:p>
             <a:pPr lvl="1"/>
             <a:r>
-              <a:rPr lang="en-US" dirty="0" smtClean="0"/>
+              <a:rPr lang="en-US" dirty="0"/>
               <a:t>Second level</a:t>
             </a:r>
           </a:p>
           <a:p>
             <a:pPr lvl="2"/>
             <a:r>
-              <a:rPr lang="en-US" dirty="0" smtClean="0"/>
+              <a:rPr lang="en-US" dirty="0"/>
               <a:t>Third level</a:t>
             </a:r>
           </a:p>
           <a:p>
             <a:pPr lvl="3"/>
             <a:r>
-              <a:rPr lang="en-US" dirty="0" smtClean="0"/>
+              <a:rPr lang="en-US" dirty="0"/>
               <a:t>Fourth level</a:t>
             </a:r>
           </a:p>
           <a:p>
             <a:pPr lvl="4"/>
             <a:r>
-              <a:rPr lang="en-US" dirty="0" smtClean="0"/>
+              <a:rPr lang="en-US" dirty="0"/>
               <a:t>Fifth level</a:t>
             </a:r>
-            <a:endParaRPr lang="en-US" dirty="0"/>
           </a:p>
         </p:txBody>
       </p:sp>
@@ -2170,13 +2116,6 @@
   <p:clrMapOvr>
     <a:masterClrMapping/>
   </p:clrMapOvr>
-  <p:timing>
-    <p:tnLst>
-      <p:par>
-        <p:cTn id="1" dur="indefinite" restart="never" nodeType="tmRoot"/>
-      </p:par>
-    </p:tnLst>
-  </p:timing>
 </p:sldLayout>
 </file>
 
@@ -2234,10 +2173,9 @@
           </a:lstStyle>
           <a:p>
             <a:r>
-              <a:rPr lang="en-US" dirty="0" smtClean="0"/>
+              <a:rPr lang="en-US" dirty="0"/>
               <a:t>Click to edit Master title style</a:t>
             </a:r>
-            <a:endParaRPr lang="en-US" dirty="0"/>
           </a:p>
         </p:txBody>
       </p:sp>
@@ -2281,13 +2219,6 @@
   <p:clrMapOvr>
     <a:masterClrMapping/>
   </p:clrMapOvr>
-  <p:timing>
-    <p:tnLst>
-      <p:par>
-        <p:cTn id="1" dur="indefinite" restart="never" nodeType="tmRoot"/>
-      </p:par>
-    </p:tnLst>
-  </p:timing>
 </p:sldLayout>
 </file>
 
@@ -2318,13 +2249,6 @@
   <p:clrMapOvr>
     <a:masterClrMapping/>
   </p:clrMapOvr>
-  <p:timing>
-    <p:tnLst>
-      <p:par>
-        <p:cTn id="1" dur="indefinite" restart="never" nodeType="tmRoot"/>
-      </p:par>
-    </p:tnLst>
-  </p:timing>
 </p:sldLayout>
 </file>
 
@@ -2375,10 +2299,9 @@
           </a:lstStyle>
           <a:p>
             <a:r>
-              <a:rPr lang="en-US" dirty="0" smtClean="0"/>
+              <a:rPr lang="en-US" dirty="0"/>
               <a:t>Click to edit Master title style</a:t>
             </a:r>
-            <a:endParaRPr lang="en-US" dirty="0"/>
           </a:p>
         </p:txBody>
       </p:sp>
@@ -2447,38 +2370,37 @@
           <a:p>
             <a:pPr lvl="0"/>
             <a:r>
-              <a:rPr lang="en-US" dirty="0" smtClean="0"/>
+              <a:rPr lang="en-US" dirty="0"/>
               <a:t>Click to edit Master text styles</a:t>
             </a:r>
           </a:p>
           <a:p>
             <a:pPr lvl="1"/>
             <a:r>
-              <a:rPr lang="en-US" dirty="0" smtClean="0"/>
+              <a:rPr lang="en-US" dirty="0"/>
               <a:t>Second level</a:t>
             </a:r>
           </a:p>
           <a:p>
             <a:pPr lvl="2"/>
             <a:r>
-              <a:rPr lang="en-US" dirty="0" smtClean="0"/>
+              <a:rPr lang="en-US" dirty="0"/>
               <a:t>Third level</a:t>
             </a:r>
           </a:p>
           <a:p>
             <a:pPr lvl="3"/>
             <a:r>
-              <a:rPr lang="en-US" dirty="0" smtClean="0"/>
+              <a:rPr lang="en-US" dirty="0"/>
               <a:t>Fourth level</a:t>
             </a:r>
           </a:p>
           <a:p>
             <a:pPr lvl="4"/>
             <a:r>
-              <a:rPr lang="en-US" dirty="0" smtClean="0"/>
+              <a:rPr lang="en-US" dirty="0"/>
               <a:t>Fifth level</a:t>
             </a:r>
-            <a:endParaRPr lang="en-US" dirty="0"/>
           </a:p>
         </p:txBody>
       </p:sp>
@@ -2541,7 +2463,7 @@
           <a:p>
             <a:pPr lvl="0"/>
             <a:r>
-              <a:rPr lang="en-US" smtClean="0"/>
+              <a:rPr lang="en-US"/>
               <a:t>Click to edit Master text styles</a:t>
             </a:r>
           </a:p>
@@ -2557,13 +2479,6 @@
   <p:clrMapOvr>
     <a:masterClrMapping/>
   </p:clrMapOvr>
-  <p:timing>
-    <p:tnLst>
-      <p:par>
-        <p:cTn id="1" dur="indefinite" restart="never" nodeType="tmRoot"/>
-      </p:par>
-    </p:tnLst>
-  </p:timing>
 </p:sldLayout>
 </file>
 
@@ -2614,10 +2529,9 @@
           </a:lstStyle>
           <a:p>
             <a:r>
-              <a:rPr lang="en-US" dirty="0" smtClean="0"/>
+              <a:rPr lang="en-US" dirty="0"/>
               <a:t>Click to edit Master title style</a:t>
             </a:r>
-            <a:endParaRPr lang="en-US" dirty="0"/>
           </a:p>
         </p:txBody>
       </p:sp>
@@ -2741,7 +2655,7 @@
           <a:p>
             <a:pPr lvl="0"/>
             <a:r>
-              <a:rPr lang="en-US" smtClean="0"/>
+              <a:rPr lang="en-US"/>
               <a:t>Click to edit Master text styles</a:t>
             </a:r>
           </a:p>
@@ -2757,13 +2671,6 @@
   <p:clrMapOvr>
     <a:masterClrMapping/>
   </p:clrMapOvr>
-  <p:timing>
-    <p:tnLst>
-      <p:par>
-        <p:cTn id="1" dur="indefinite" restart="never" nodeType="tmRoot"/>
-      </p:par>
-    </p:tnLst>
-  </p:timing>
 </p:sldLayout>
 </file>
 
@@ -2815,10 +2722,9 @@
           <a:lstStyle/>
           <a:p>
             <a:r>
-              <a:rPr lang="en-US" dirty="0" smtClean="0"/>
+              <a:rPr lang="en-US" dirty="0"/>
               <a:t>Click to edit Master title style</a:t>
             </a:r>
-            <a:endParaRPr lang="en-US" dirty="0"/>
           </a:p>
         </p:txBody>
       </p:sp>
@@ -2849,38 +2755,37 @@
           <a:p>
             <a:pPr lvl="0"/>
             <a:r>
-              <a:rPr lang="en-US" smtClean="0"/>
+              <a:rPr lang="en-US"/>
               <a:t>Click to edit Master text styles</a:t>
             </a:r>
           </a:p>
           <a:p>
             <a:pPr lvl="1"/>
             <a:r>
-              <a:rPr lang="en-US" smtClean="0"/>
+              <a:rPr lang="en-US"/>
               <a:t>Second level</a:t>
             </a:r>
           </a:p>
           <a:p>
             <a:pPr lvl="2"/>
             <a:r>
-              <a:rPr lang="en-US" smtClean="0"/>
+              <a:rPr lang="en-US"/>
               <a:t>Third level</a:t>
             </a:r>
           </a:p>
           <a:p>
             <a:pPr lvl="3"/>
             <a:r>
-              <a:rPr lang="en-US" smtClean="0"/>
+              <a:rPr lang="en-US"/>
               <a:t>Fourth level</a:t>
             </a:r>
           </a:p>
           <a:p>
             <a:pPr lvl="4"/>
             <a:r>
-              <a:rPr lang="en-US" smtClean="0"/>
+              <a:rPr lang="en-US"/>
               <a:t>Fifth level</a:t>
             </a:r>
-            <a:endParaRPr lang="en-US"/>
           </a:p>
         </p:txBody>
       </p:sp>
@@ -2981,13 +2886,6 @@
     <p:sldLayoutId id="2147483658" r:id="rId10"/>
     <p:sldLayoutId id="2147483659" r:id="rId11"/>
   </p:sldLayoutIdLst>
-  <p:timing>
-    <p:tnLst>
-      <p:par>
-        <p:cTn id="1" dur="indefinite" restart="never" nodeType="tmRoot"/>
-      </p:par>
-    </p:tnLst>
-  </p:timing>
   <p:txStyles>
     <p:titleStyle>
       <a:lvl1pPr algn="l" defTabSz="914400" rtl="0" eaLnBrk="1" latinLnBrk="0" hangingPunct="1">
@@ -3304,10 +3202,9 @@
           <a:lstStyle/>
           <a:p>
             <a:r>
-              <a:rPr lang="en-US" dirty="0" smtClean="0"/>
+              <a:rPr lang="en-US" dirty="0"/>
               <a:t>Introduction</a:t>
             </a:r>
-            <a:endParaRPr lang="en-US" dirty="0"/>
           </a:p>
         </p:txBody>
       </p:sp>
@@ -3327,10 +3224,9 @@
           <a:lstStyle/>
           <a:p>
             <a:r>
-              <a:rPr lang="en-US" dirty="0" smtClean="0"/>
+              <a:rPr lang="en-US" dirty="0"/>
               <a:t>Welcome</a:t>
             </a:r>
-            <a:endParaRPr lang="en-US" dirty="0"/>
           </a:p>
         </p:txBody>
       </p:sp>
@@ -3344,13 +3240,6 @@
   <p:clrMapOvr>
     <a:masterClrMapping/>
   </p:clrMapOvr>
-  <p:timing>
-    <p:tnLst>
-      <p:par>
-        <p:cTn id="1" dur="indefinite" restart="never" nodeType="tmRoot"/>
-      </p:par>
-    </p:tnLst>
-  </p:timing>
 </p:sld>
 </file>
 

</xml_diff>